<commit_message>
added simple unit test
</commit_message>
<xml_diff>
--- a/docs/Presentation1.pptx
+++ b/docs/Presentation1.pptx
@@ -19,7 +19,8 @@
     <p:sldId id="269" r:id="rId13"/>
     <p:sldId id="266" r:id="rId14"/>
     <p:sldId id="268" r:id="rId15"/>
-    <p:sldId id="267" r:id="rId16"/>
+    <p:sldId id="271" r:id="rId16"/>
+    <p:sldId id="267" r:id="rId17"/>
   </p:sldIdLst>
   <p:sldSz cx="12192000" cy="6858000"/>
   <p:notesSz cx="6858000" cy="9144000"/>
@@ -273,7 +274,7 @@
           <a:p>
             <a:fld id="{06DDBAC8-6DAA-4892-BF9F-7E3FCCEF3412}" type="datetimeFigureOut">
               <a:rPr lang="en-US" smtClean="0"/>
-              <a:t>4/25/2024</a:t>
+              <a:t>4/26/2024</a:t>
             </a:fld>
             <a:endParaRPr lang="en-US"/>
           </a:p>
@@ -471,7 +472,7 @@
           <a:p>
             <a:fld id="{06DDBAC8-6DAA-4892-BF9F-7E3FCCEF3412}" type="datetimeFigureOut">
               <a:rPr lang="en-US" smtClean="0"/>
-              <a:t>4/25/2024</a:t>
+              <a:t>4/26/2024</a:t>
             </a:fld>
             <a:endParaRPr lang="en-US"/>
           </a:p>
@@ -679,7 +680,7 @@
           <a:p>
             <a:fld id="{06DDBAC8-6DAA-4892-BF9F-7E3FCCEF3412}" type="datetimeFigureOut">
               <a:rPr lang="en-US" smtClean="0"/>
-              <a:t>4/25/2024</a:t>
+              <a:t>4/26/2024</a:t>
             </a:fld>
             <a:endParaRPr lang="en-US"/>
           </a:p>
@@ -877,7 +878,7 @@
           <a:p>
             <a:fld id="{06DDBAC8-6DAA-4892-BF9F-7E3FCCEF3412}" type="datetimeFigureOut">
               <a:rPr lang="en-US" smtClean="0"/>
-              <a:t>4/25/2024</a:t>
+              <a:t>4/26/2024</a:t>
             </a:fld>
             <a:endParaRPr lang="en-US"/>
           </a:p>
@@ -1152,7 +1153,7 @@
           <a:p>
             <a:fld id="{06DDBAC8-6DAA-4892-BF9F-7E3FCCEF3412}" type="datetimeFigureOut">
               <a:rPr lang="en-US" smtClean="0"/>
-              <a:t>4/25/2024</a:t>
+              <a:t>4/26/2024</a:t>
             </a:fld>
             <a:endParaRPr lang="en-US"/>
           </a:p>
@@ -1417,7 +1418,7 @@
           <a:p>
             <a:fld id="{06DDBAC8-6DAA-4892-BF9F-7E3FCCEF3412}" type="datetimeFigureOut">
               <a:rPr lang="en-US" smtClean="0"/>
-              <a:t>4/25/2024</a:t>
+              <a:t>4/26/2024</a:t>
             </a:fld>
             <a:endParaRPr lang="en-US"/>
           </a:p>
@@ -1829,7 +1830,7 @@
           <a:p>
             <a:fld id="{06DDBAC8-6DAA-4892-BF9F-7E3FCCEF3412}" type="datetimeFigureOut">
               <a:rPr lang="en-US" smtClean="0"/>
-              <a:t>4/25/2024</a:t>
+              <a:t>4/26/2024</a:t>
             </a:fld>
             <a:endParaRPr lang="en-US"/>
           </a:p>
@@ -1970,7 +1971,7 @@
           <a:p>
             <a:fld id="{06DDBAC8-6DAA-4892-BF9F-7E3FCCEF3412}" type="datetimeFigureOut">
               <a:rPr lang="en-US" smtClean="0"/>
-              <a:t>4/25/2024</a:t>
+              <a:t>4/26/2024</a:t>
             </a:fld>
             <a:endParaRPr lang="en-US"/>
           </a:p>
@@ -2083,7 +2084,7 @@
           <a:p>
             <a:fld id="{06DDBAC8-6DAA-4892-BF9F-7E3FCCEF3412}" type="datetimeFigureOut">
               <a:rPr lang="en-US" smtClean="0"/>
-              <a:t>4/25/2024</a:t>
+              <a:t>4/26/2024</a:t>
             </a:fld>
             <a:endParaRPr lang="en-US"/>
           </a:p>
@@ -2394,7 +2395,7 @@
           <a:p>
             <a:fld id="{06DDBAC8-6DAA-4892-BF9F-7E3FCCEF3412}" type="datetimeFigureOut">
               <a:rPr lang="en-US" smtClean="0"/>
-              <a:t>4/25/2024</a:t>
+              <a:t>4/26/2024</a:t>
             </a:fld>
             <a:endParaRPr lang="en-US"/>
           </a:p>
@@ -2682,7 +2683,7 @@
           <a:p>
             <a:fld id="{06DDBAC8-6DAA-4892-BF9F-7E3FCCEF3412}" type="datetimeFigureOut">
               <a:rPr lang="en-US" smtClean="0"/>
-              <a:t>4/25/2024</a:t>
+              <a:t>4/26/2024</a:t>
             </a:fld>
             <a:endParaRPr lang="en-US"/>
           </a:p>
@@ -2923,7 +2924,7 @@
           <a:p>
             <a:fld id="{06DDBAC8-6DAA-4892-BF9F-7E3FCCEF3412}" type="datetimeFigureOut">
               <a:rPr lang="en-US" smtClean="0"/>
-              <a:t>4/25/2024</a:t>
+              <a:t>4/26/2024</a:t>
             </a:fld>
             <a:endParaRPr lang="en-US"/>
           </a:p>
@@ -4695,6 +4696,14 @@
 <file path=ppt/slides/slide15.xml><?xml version="1.0" encoding="utf-8"?>
 <p:sld xmlns:a="http://schemas.openxmlformats.org/drawingml/2006/main" xmlns:r="http://schemas.openxmlformats.org/officeDocument/2006/relationships" xmlns:p="http://schemas.openxmlformats.org/presentationml/2006/main">
   <p:cSld>
+    <p:bg>
+      <p:bgPr>
+        <a:solidFill>
+          <a:schemeClr val="bg1"/>
+        </a:solidFill>
+        <a:effectLst/>
+      </p:bgPr>
+    </p:bg>
     <p:spTree>
       <p:nvGrpSpPr>
         <p:cNvPr id="1" name=""/>
@@ -4711,9 +4720,175 @@
       </p:grpSpPr>
       <p:sp>
         <p:nvSpPr>
+          <p:cNvPr id="10" name="Rectangle 9">
+            <a:extLst>
+              <a:ext uri="{FF2B5EF4-FFF2-40B4-BE49-F238E27FC236}">
+                <a16:creationId xmlns:a16="http://schemas.microsoft.com/office/drawing/2014/main" id="{A4AC5506-6312-4701-8D3C-40187889A947}"/>
+              </a:ext>
+              <a:ext uri="{C183D7F6-B498-43B3-948B-1728B52AA6E4}">
+                <adec:decorative xmlns:adec="http://schemas.microsoft.com/office/drawing/2017/decorative" val="1"/>
+              </a:ext>
+            </a:extLst>
+          </p:cNvPr>
+          <p:cNvSpPr>
+            <a:spLocks noGrp="1" noRot="1" noChangeAspect="1" noMove="1" noResize="1" noEditPoints="1" noAdjustHandles="1" noChangeArrowheads="1" noChangeShapeType="1" noTextEdit="1"/>
+          </p:cNvSpPr>
+          <p:nvPr>
+            <p:extLst>
+              <p:ext uri="{386F3935-93C4-4BCD-93E2-E3B085C9AB24}">
+                <p16:designElem xmlns:p16="http://schemas.microsoft.com/office/powerpoint/2015/main" val="1"/>
+              </p:ext>
+            </p:extLst>
+          </p:nvPr>
+        </p:nvSpPr>
+        <p:spPr>
+          <a:xfrm>
+            <a:off x="0" y="651752"/>
+            <a:ext cx="12192000" cy="736551"/>
+          </a:xfrm>
+          <a:prstGeom prst="rect">
+            <a:avLst/>
+          </a:prstGeom>
+          <a:solidFill>
+            <a:schemeClr val="tx1"/>
+          </a:solidFill>
+          <a:ln>
+            <a:noFill/>
+          </a:ln>
+        </p:spPr>
+        <p:style>
+          <a:lnRef idx="2">
+            <a:schemeClr val="accent1">
+              <a:shade val="50000"/>
+            </a:schemeClr>
+          </a:lnRef>
+          <a:fillRef idx="1">
+            <a:schemeClr val="accent1"/>
+          </a:fillRef>
+          <a:effectRef idx="0">
+            <a:schemeClr val="accent1"/>
+          </a:effectRef>
+          <a:fontRef idx="minor">
+            <a:schemeClr val="lt1"/>
+          </a:fontRef>
+        </p:style>
+        <p:txBody>
+          <a:bodyPr rtlCol="0" anchor="ctr"/>
+          <a:lstStyle/>
+          <a:p>
+            <a:pPr algn="ctr"/>
+            <a:endParaRPr lang="en-US"/>
+          </a:p>
+        </p:txBody>
+      </p:sp>
+      <p:sp>
+        <p:nvSpPr>
           <p:cNvPr id="2" name="Title 1">
             <a:extLst>
               <a:ext uri="{FF2B5EF4-FFF2-40B4-BE49-F238E27FC236}">
+                <a16:creationId xmlns:a16="http://schemas.microsoft.com/office/drawing/2014/main" id="{ECAC8D1F-7640-FE07-FBBE-2C1C99A02EC2}"/>
+              </a:ext>
+            </a:extLst>
+          </p:cNvPr>
+          <p:cNvSpPr>
+            <a:spLocks noGrp="1"/>
+          </p:cNvSpPr>
+          <p:nvPr>
+            <p:ph type="title"/>
+          </p:nvPr>
+        </p:nvSpPr>
+        <p:spPr>
+          <a:xfrm>
+            <a:off x="556532" y="643467"/>
+            <a:ext cx="11210925" cy="744836"/>
+          </a:xfrm>
+        </p:spPr>
+        <p:txBody>
+          <a:bodyPr vert="horz" lIns="91440" tIns="45720" rIns="91440" bIns="45720" rtlCol="0" anchor="ctr">
+            <a:normAutofit/>
+          </a:bodyPr>
+          <a:lstStyle/>
+          <a:p>
+            <a:pPr algn="ctr"/>
+            <a:r>
+              <a:rPr lang="en-US" sz="3200" kern="1200" dirty="0">
+                <a:solidFill>
+                  <a:schemeClr val="bg1"/>
+                </a:solidFill>
+                <a:latin typeface="+mj-lt"/>
+                <a:ea typeface="+mj-ea"/>
+                <a:cs typeface="+mj-cs"/>
+              </a:rPr>
+              <a:t>Unit &amp; Integration Test</a:t>
+            </a:r>
+          </a:p>
+        </p:txBody>
+      </p:sp>
+      <p:pic>
+        <p:nvPicPr>
+          <p:cNvPr id="5" name="Picture 4">
+            <a:extLst>
+              <a:ext uri="{FF2B5EF4-FFF2-40B4-BE49-F238E27FC236}">
+                <a16:creationId xmlns:a16="http://schemas.microsoft.com/office/drawing/2014/main" id="{A7F93A3E-5B90-8E24-D9EA-76BEA5CB8A30}"/>
+              </a:ext>
+            </a:extLst>
+          </p:cNvPr>
+          <p:cNvPicPr>
+            <a:picLocks noChangeAspect="1"/>
+          </p:cNvPicPr>
+          <p:nvPr/>
+        </p:nvPicPr>
+        <p:blipFill>
+          <a:blip r:embed="rId2"/>
+          <a:stretch>
+            <a:fillRect/>
+          </a:stretch>
+        </p:blipFill>
+        <p:spPr>
+          <a:xfrm>
+            <a:off x="1543050" y="1535164"/>
+            <a:ext cx="9105900" cy="5066682"/>
+          </a:xfrm>
+          <a:prstGeom prst="rect">
+            <a:avLst/>
+          </a:prstGeom>
+        </p:spPr>
+      </p:pic>
+    </p:spTree>
+    <p:extLst>
+      <p:ext uri="{BB962C8B-B14F-4D97-AF65-F5344CB8AC3E}">
+        <p14:creationId xmlns:p14="http://schemas.microsoft.com/office/powerpoint/2010/main" val="3869610014"/>
+      </p:ext>
+    </p:extLst>
+  </p:cSld>
+  <p:clrMapOvr>
+    <a:masterClrMapping/>
+  </p:clrMapOvr>
+</p:sld>
+</file>
+
+<file path=ppt/slides/slide16.xml><?xml version="1.0" encoding="utf-8"?>
+<p:sld xmlns:a="http://schemas.openxmlformats.org/drawingml/2006/main" xmlns:r="http://schemas.openxmlformats.org/officeDocument/2006/relationships" xmlns:p="http://schemas.openxmlformats.org/presentationml/2006/main">
+  <p:cSld>
+    <p:spTree>
+      <p:nvGrpSpPr>
+        <p:cNvPr id="1" name=""/>
+        <p:cNvGrpSpPr/>
+        <p:nvPr/>
+      </p:nvGrpSpPr>
+      <p:grpSpPr>
+        <a:xfrm>
+          <a:off x="0" y="0"/>
+          <a:ext cx="0" cy="0"/>
+          <a:chOff x="0" y="0"/>
+          <a:chExt cx="0" cy="0"/>
+        </a:xfrm>
+      </p:grpSpPr>
+      <p:sp>
+        <p:nvSpPr>
+          <p:cNvPr id="2" name="Title 1">
+            <a:extLst>
+              <a:ext uri="{FF2B5EF4-FFF2-40B4-BE49-F238E27FC236}">
                 <a16:creationId xmlns:a16="http://schemas.microsoft.com/office/drawing/2014/main" id="{85F45C74-82C3-B82E-C122-5B21BFD69602}"/>
               </a:ext>
             </a:extLst>
@@ -4725,14 +4900,20 @@
             <p:ph type="title"/>
           </p:nvPr>
         </p:nvSpPr>
-        <p:spPr/>
+        <p:spPr>
+          <a:xfrm>
+            <a:off x="545969" y="2646411"/>
+            <a:ext cx="10515600" cy="1325563"/>
+          </a:xfrm>
+        </p:spPr>
         <p:txBody>
           <a:bodyPr/>
           <a:lstStyle/>
           <a:p>
+            <a:pPr algn="ctr"/>
             <a:r>
               <a:rPr lang="en-US" dirty="0"/>
-              <a:t>Authentication layer</a:t>
+              <a:t>Thank you</a:t>
             </a:r>
           </a:p>
         </p:txBody>

</xml_diff>